<commit_message>
Design up to DM
Zemax design :
alpha OAP0/1 = 20°, fOAP0/1 = 445mm

Report : jusqu'au DM tilté pour compensé tilt OAP0
</commit_message>
<xml_diff>
--- a/images/images_sketch.pptx
+++ b/images/images_sketch.pptx
@@ -5,10 +5,12 @@
     <p:sldMasterId id="2147483648" r:id="rId1"/>
   </p:sldMasterIdLst>
   <p:notesMasterIdLst>
-    <p:notesMasterId r:id="rId3"/>
+    <p:notesMasterId r:id="rId5"/>
   </p:notesMasterIdLst>
   <p:sldIdLst>
     <p:sldId id="256" r:id="rId2"/>
+    <p:sldId id="257" r:id="rId3"/>
+    <p:sldId id="258" r:id="rId4"/>
   </p:sldIdLst>
   <p:sldSz cx="12192000" cy="6858000"/>
   <p:notesSz cx="6858000" cy="9144000"/>
@@ -107,6 +109,11 @@
       </a:defRPr>
     </a:lvl9pPr>
   </p:defaultTextStyle>
+  <p:extLst>
+    <p:ext uri="{EFAFB233-063F-42B5-8137-9DF3F51BA10A}">
+      <p15:sldGuideLst xmlns:p15="http://schemas.microsoft.com/office/powerpoint/2012/main"/>
+    </p:ext>
+  </p:extLst>
 </p:presentation>
 </file>
 
@@ -192,7 +199,7 @@
           <a:p>
             <a:fld id="{8EDEE2E2-4BE4-41CA-94FC-BC9DC2A64380}" type="datetimeFigureOut">
               <a:rPr lang="en-GB" smtClean="0"/>
-              <a:t>18/05/2018</a:t>
+              <a:t>22/05/2018</a:t>
             </a:fld>
             <a:endParaRPr lang="en-GB"/>
           </a:p>
@@ -591,7 +598,7 @@
           <a:p>
             <a:fld id="{24AF4860-EF53-429F-9816-8C3FCB6EDEF9}" type="datetimeFigureOut">
               <a:rPr lang="en-GB" smtClean="0"/>
-              <a:t>18/05/2018</a:t>
+              <a:t>22/05/2018</a:t>
             </a:fld>
             <a:endParaRPr lang="en-GB"/>
           </a:p>
@@ -761,7 +768,7 @@
           <a:p>
             <a:fld id="{24AF4860-EF53-429F-9816-8C3FCB6EDEF9}" type="datetimeFigureOut">
               <a:rPr lang="en-GB" smtClean="0"/>
-              <a:t>18/05/2018</a:t>
+              <a:t>22/05/2018</a:t>
             </a:fld>
             <a:endParaRPr lang="en-GB"/>
           </a:p>
@@ -941,7 +948,7 @@
           <a:p>
             <a:fld id="{24AF4860-EF53-429F-9816-8C3FCB6EDEF9}" type="datetimeFigureOut">
               <a:rPr lang="en-GB" smtClean="0"/>
-              <a:t>18/05/2018</a:t>
+              <a:t>22/05/2018</a:t>
             </a:fld>
             <a:endParaRPr lang="en-GB"/>
           </a:p>
@@ -1111,7 +1118,7 @@
           <a:p>
             <a:fld id="{24AF4860-EF53-429F-9816-8C3FCB6EDEF9}" type="datetimeFigureOut">
               <a:rPr lang="en-GB" smtClean="0"/>
-              <a:t>18/05/2018</a:t>
+              <a:t>22/05/2018</a:t>
             </a:fld>
             <a:endParaRPr lang="en-GB"/>
           </a:p>
@@ -1357,7 +1364,7 @@
           <a:p>
             <a:fld id="{24AF4860-EF53-429F-9816-8C3FCB6EDEF9}" type="datetimeFigureOut">
               <a:rPr lang="en-GB" smtClean="0"/>
-              <a:t>18/05/2018</a:t>
+              <a:t>22/05/2018</a:t>
             </a:fld>
             <a:endParaRPr lang="en-GB"/>
           </a:p>
@@ -1589,7 +1596,7 @@
           <a:p>
             <a:fld id="{24AF4860-EF53-429F-9816-8C3FCB6EDEF9}" type="datetimeFigureOut">
               <a:rPr lang="en-GB" smtClean="0"/>
-              <a:t>18/05/2018</a:t>
+              <a:t>22/05/2018</a:t>
             </a:fld>
             <a:endParaRPr lang="en-GB"/>
           </a:p>
@@ -1956,7 +1963,7 @@
           <a:p>
             <a:fld id="{24AF4860-EF53-429F-9816-8C3FCB6EDEF9}" type="datetimeFigureOut">
               <a:rPr lang="en-GB" smtClean="0"/>
-              <a:t>18/05/2018</a:t>
+              <a:t>22/05/2018</a:t>
             </a:fld>
             <a:endParaRPr lang="en-GB"/>
           </a:p>
@@ -2074,7 +2081,7 @@
           <a:p>
             <a:fld id="{24AF4860-EF53-429F-9816-8C3FCB6EDEF9}" type="datetimeFigureOut">
               <a:rPr lang="en-GB" smtClean="0"/>
-              <a:t>18/05/2018</a:t>
+              <a:t>22/05/2018</a:t>
             </a:fld>
             <a:endParaRPr lang="en-GB"/>
           </a:p>
@@ -2169,7 +2176,7 @@
           <a:p>
             <a:fld id="{24AF4860-EF53-429F-9816-8C3FCB6EDEF9}" type="datetimeFigureOut">
               <a:rPr lang="en-GB" smtClean="0"/>
-              <a:t>18/05/2018</a:t>
+              <a:t>22/05/2018</a:t>
             </a:fld>
             <a:endParaRPr lang="en-GB"/>
           </a:p>
@@ -2446,7 +2453,7 @@
           <a:p>
             <a:fld id="{24AF4860-EF53-429F-9816-8C3FCB6EDEF9}" type="datetimeFigureOut">
               <a:rPr lang="en-GB" smtClean="0"/>
-              <a:t>18/05/2018</a:t>
+              <a:t>22/05/2018</a:t>
             </a:fld>
             <a:endParaRPr lang="en-GB"/>
           </a:p>
@@ -2699,7 +2706,7 @@
           <a:p>
             <a:fld id="{24AF4860-EF53-429F-9816-8C3FCB6EDEF9}" type="datetimeFigureOut">
               <a:rPr lang="en-GB" smtClean="0"/>
-              <a:t>18/05/2018</a:t>
+              <a:t>22/05/2018</a:t>
             </a:fld>
             <a:endParaRPr lang="en-GB"/>
           </a:p>
@@ -2912,7 +2919,7 @@
           <a:p>
             <a:fld id="{24AF4860-EF53-429F-9816-8C3FCB6EDEF9}" type="datetimeFigureOut">
               <a:rPr lang="en-GB" smtClean="0"/>
-              <a:t>18/05/2018</a:t>
+              <a:t>22/05/2018</a:t>
             </a:fld>
             <a:endParaRPr lang="en-GB"/>
           </a:p>
@@ -3662,7 +3669,7 @@
           <a:lstStyle/>
           <a:p>
             <a:r>
-              <a:rPr lang="en-GB" dirty="0" err="1" smtClean="0"/>
+              <a:rPr lang="en-GB" dirty="0" smtClean="0"/>
               <a:t>FoV</a:t>
             </a:r>
             <a:endParaRPr lang="en-GB" dirty="0"/>
@@ -4019,7 +4026,7 @@
           <a:lstStyle/>
           <a:p>
             <a:r>
-              <a:rPr lang="en-GB" dirty="0" err="1" smtClean="0"/>
+              <a:rPr lang="en-GB" dirty="0" smtClean="0"/>
               <a:t>FoV</a:t>
             </a:r>
             <a:endParaRPr lang="en-GB" dirty="0"/>
@@ -4099,7 +4106,7 @@
           <a:lstStyle/>
           <a:p>
             <a:r>
-              <a:rPr lang="en-GB" dirty="0" err="1" smtClean="0"/>
+              <a:rPr lang="en-GB" dirty="0" smtClean="0"/>
               <a:t>FoV</a:t>
             </a:r>
             <a:endParaRPr lang="en-GB" dirty="0"/>
@@ -4308,6 +4315,1362 @@
     <p:extLst>
       <p:ext uri="{BB962C8B-B14F-4D97-AF65-F5344CB8AC3E}">
         <p14:creationId xmlns:p14="http://schemas.microsoft.com/office/powerpoint/2010/main" val="2921800504"/>
+      </p:ext>
+    </p:extLst>
+  </p:cSld>
+  <p:clrMapOvr>
+    <a:masterClrMapping/>
+  </p:clrMapOvr>
+</p:sld>
+</file>
+
+<file path=ppt/slides/slide2.xml><?xml version="1.0" encoding="utf-8"?>
+<p:sld xmlns:a="http://schemas.openxmlformats.org/drawingml/2006/main" xmlns:r="http://schemas.openxmlformats.org/officeDocument/2006/relationships" xmlns:p="http://schemas.openxmlformats.org/presentationml/2006/main">
+  <p:cSld>
+    <p:spTree>
+      <p:nvGrpSpPr>
+        <p:cNvPr id="1" name=""/>
+        <p:cNvGrpSpPr/>
+        <p:nvPr/>
+      </p:nvGrpSpPr>
+      <p:grpSpPr>
+        <a:xfrm>
+          <a:off x="0" y="0"/>
+          <a:ext cx="0" cy="0"/>
+          <a:chOff x="0" y="0"/>
+          <a:chExt cx="0" cy="0"/>
+        </a:xfrm>
+      </p:grpSpPr>
+      <p:pic>
+        <p:nvPicPr>
+          <p:cNvPr id="4" name="Image 3"/>
+          <p:cNvPicPr>
+            <a:picLocks noChangeAspect="1"/>
+          </p:cNvPicPr>
+          <p:nvPr/>
+        </p:nvPicPr>
+        <p:blipFill rotWithShape="1">
+          <a:blip r:embed="rId2"/>
+          <a:srcRect b="27155"/>
+          <a:stretch/>
+        </p:blipFill>
+        <p:spPr>
+          <a:xfrm>
+            <a:off x="33094" y="143873"/>
+            <a:ext cx="5579698" cy="2697319"/>
+          </a:xfrm>
+          <a:prstGeom prst="rect">
+            <a:avLst/>
+          </a:prstGeom>
+        </p:spPr>
+      </p:pic>
+      <p:pic>
+        <p:nvPicPr>
+          <p:cNvPr id="5" name="Image 4"/>
+          <p:cNvPicPr>
+            <a:picLocks noChangeAspect="1"/>
+          </p:cNvPicPr>
+          <p:nvPr/>
+        </p:nvPicPr>
+        <p:blipFill rotWithShape="1">
+          <a:blip r:embed="rId3"/>
+          <a:srcRect t="9115" b="21650"/>
+          <a:stretch/>
+        </p:blipFill>
+        <p:spPr>
+          <a:xfrm>
+            <a:off x="5816395" y="146304"/>
+            <a:ext cx="5857644" cy="2807208"/>
+          </a:xfrm>
+          <a:prstGeom prst="rect">
+            <a:avLst/>
+          </a:prstGeom>
+        </p:spPr>
+      </p:pic>
+      <p:pic>
+        <p:nvPicPr>
+          <p:cNvPr id="6" name="Image 5"/>
+          <p:cNvPicPr>
+            <a:picLocks noChangeAspect="1"/>
+          </p:cNvPicPr>
+          <p:nvPr/>
+        </p:nvPicPr>
+        <p:blipFill rotWithShape="1">
+          <a:blip r:embed="rId4"/>
+          <a:srcRect l="431" t="8895" r="-431" b="25181"/>
+          <a:stretch/>
+        </p:blipFill>
+        <p:spPr>
+          <a:xfrm>
+            <a:off x="5816395" y="3755707"/>
+            <a:ext cx="6125477" cy="2605088"/>
+          </a:xfrm>
+          <a:prstGeom prst="rect">
+            <a:avLst/>
+          </a:prstGeom>
+        </p:spPr>
+      </p:pic>
+      <p:pic>
+        <p:nvPicPr>
+          <p:cNvPr id="7" name="Image 6"/>
+          <p:cNvPicPr>
+            <a:picLocks noChangeAspect="1"/>
+          </p:cNvPicPr>
+          <p:nvPr/>
+        </p:nvPicPr>
+        <p:blipFill rotWithShape="1">
+          <a:blip r:embed="rId5"/>
+          <a:srcRect t="5085" b="27180"/>
+          <a:stretch/>
+        </p:blipFill>
+        <p:spPr>
+          <a:xfrm>
+            <a:off x="172478" y="3755707"/>
+            <a:ext cx="5643917" cy="2673668"/>
+          </a:xfrm>
+          <a:prstGeom prst="rect">
+            <a:avLst/>
+          </a:prstGeom>
+        </p:spPr>
+      </p:pic>
+      <p:sp>
+        <p:nvSpPr>
+          <p:cNvPr id="8" name="ZoneTexte 7"/>
+          <p:cNvSpPr txBox="1"/>
+          <p:nvPr/>
+        </p:nvSpPr>
+        <p:spPr>
+          <a:xfrm>
+            <a:off x="1218211" y="531983"/>
+            <a:ext cx="524503" cy="369332"/>
+          </a:xfrm>
+          <a:prstGeom prst="rect">
+            <a:avLst/>
+          </a:prstGeom>
+          <a:noFill/>
+        </p:spPr>
+        <p:txBody>
+          <a:bodyPr wrap="none" rtlCol="0">
+            <a:spAutoFit/>
+          </a:bodyPr>
+          <a:lstStyle/>
+          <a:p>
+            <a:r>
+              <a:rPr lang="en-GB" dirty="0" smtClean="0"/>
+              <a:t>DM</a:t>
+            </a:r>
+            <a:endParaRPr lang="en-GB" dirty="0"/>
+          </a:p>
+        </p:txBody>
+      </p:sp>
+      <p:sp>
+        <p:nvSpPr>
+          <p:cNvPr id="9" name="ZoneTexte 8"/>
+          <p:cNvSpPr txBox="1"/>
+          <p:nvPr/>
+        </p:nvSpPr>
+        <p:spPr>
+          <a:xfrm>
+            <a:off x="507792" y="2328028"/>
+            <a:ext cx="2180020" cy="369332"/>
+          </a:xfrm>
+          <a:prstGeom prst="rect">
+            <a:avLst/>
+          </a:prstGeom>
+          <a:noFill/>
+        </p:spPr>
+        <p:txBody>
+          <a:bodyPr wrap="none" rtlCol="0">
+            <a:spAutoFit/>
+          </a:bodyPr>
+          <a:lstStyle/>
+          <a:p>
+            <a:r>
+              <a:rPr lang="en-GB" dirty="0" smtClean="0"/>
+              <a:t>Telescope focal plane</a:t>
+            </a:r>
+            <a:endParaRPr lang="en-GB" dirty="0"/>
+          </a:p>
+        </p:txBody>
+      </p:sp>
+      <p:cxnSp>
+        <p:nvCxnSpPr>
+          <p:cNvPr id="11" name="Connecteur en angle 10"/>
+          <p:cNvCxnSpPr/>
+          <p:nvPr/>
+        </p:nvCxnSpPr>
+        <p:spPr>
+          <a:xfrm rot="5400000" flipH="1" flipV="1">
+            <a:off x="1470721" y="2019362"/>
+            <a:ext cx="393192" cy="341253"/>
+          </a:xfrm>
+          <a:prstGeom prst="bentConnector3">
+            <a:avLst/>
+          </a:prstGeom>
+          <a:ln>
+            <a:solidFill>
+              <a:schemeClr val="tx1"/>
+            </a:solidFill>
+            <a:tailEnd type="triangle"/>
+          </a:ln>
+        </p:spPr>
+        <p:style>
+          <a:lnRef idx="1">
+            <a:schemeClr val="accent1"/>
+          </a:lnRef>
+          <a:fillRef idx="0">
+            <a:schemeClr val="accent1"/>
+          </a:fillRef>
+          <a:effectRef idx="0">
+            <a:schemeClr val="accent1"/>
+          </a:effectRef>
+          <a:fontRef idx="minor">
+            <a:schemeClr val="tx1"/>
+          </a:fontRef>
+        </p:style>
+      </p:cxnSp>
+      <p:sp>
+        <p:nvSpPr>
+          <p:cNvPr id="21" name="Rectangle 20"/>
+          <p:cNvSpPr/>
+          <p:nvPr/>
+        </p:nvSpPr>
+        <p:spPr>
+          <a:xfrm>
+            <a:off x="7872984" y="1204652"/>
+            <a:ext cx="1527048" cy="1492707"/>
+          </a:xfrm>
+          <a:prstGeom prst="rect">
+            <a:avLst/>
+          </a:prstGeom>
+          <a:solidFill>
+            <a:srgbClr val="5B9BD5">
+              <a:alpha val="21176"/>
+            </a:srgbClr>
+          </a:solidFill>
+          <a:ln>
+            <a:solidFill>
+              <a:schemeClr val="tx1"/>
+            </a:solidFill>
+          </a:ln>
+        </p:spPr>
+        <p:style>
+          <a:lnRef idx="2">
+            <a:schemeClr val="accent1">
+              <a:shade val="50000"/>
+            </a:schemeClr>
+          </a:lnRef>
+          <a:fillRef idx="1">
+            <a:schemeClr val="accent1"/>
+          </a:fillRef>
+          <a:effectRef idx="0">
+            <a:schemeClr val="accent1"/>
+          </a:effectRef>
+          <a:fontRef idx="minor">
+            <a:schemeClr val="lt1"/>
+          </a:fontRef>
+        </p:style>
+        <p:txBody>
+          <a:bodyPr rtlCol="0" anchor="ctr"/>
+          <a:lstStyle/>
+          <a:p>
+            <a:pPr algn="ctr"/>
+            <a:endParaRPr lang="en-GB" dirty="0"/>
+          </a:p>
+        </p:txBody>
+      </p:sp>
+      <p:sp>
+        <p:nvSpPr>
+          <p:cNvPr id="22" name="ZoneTexte 21"/>
+          <p:cNvSpPr txBox="1"/>
+          <p:nvPr/>
+        </p:nvSpPr>
+        <p:spPr>
+          <a:xfrm>
+            <a:off x="7872984" y="1180576"/>
+            <a:ext cx="509627" cy="369332"/>
+          </a:xfrm>
+          <a:prstGeom prst="rect">
+            <a:avLst/>
+          </a:prstGeom>
+          <a:noFill/>
+        </p:spPr>
+        <p:txBody>
+          <a:bodyPr wrap="none" rtlCol="0">
+            <a:spAutoFit/>
+          </a:bodyPr>
+          <a:lstStyle/>
+          <a:p>
+            <a:r>
+              <a:rPr lang="en-GB" dirty="0" smtClean="0"/>
+              <a:t>FCL</a:t>
+            </a:r>
+            <a:endParaRPr lang="en-GB" dirty="0"/>
+          </a:p>
+        </p:txBody>
+      </p:sp>
+      <p:cxnSp>
+        <p:nvCxnSpPr>
+          <p:cNvPr id="24" name="Connecteur droit avec flèche 23"/>
+          <p:cNvCxnSpPr/>
+          <p:nvPr/>
+        </p:nvCxnSpPr>
+        <p:spPr>
+          <a:xfrm>
+            <a:off x="7872984" y="2953512"/>
+            <a:ext cx="1527048" cy="0"/>
+          </a:xfrm>
+          <a:prstGeom prst="straightConnector1">
+            <a:avLst/>
+          </a:prstGeom>
+          <a:ln>
+            <a:solidFill>
+              <a:schemeClr val="tx1"/>
+            </a:solidFill>
+            <a:headEnd type="arrow" w="med" len="med"/>
+            <a:tailEnd type="arrow" w="med" len="med"/>
+          </a:ln>
+        </p:spPr>
+        <p:style>
+          <a:lnRef idx="1">
+            <a:schemeClr val="accent1"/>
+          </a:lnRef>
+          <a:fillRef idx="0">
+            <a:schemeClr val="accent1"/>
+          </a:fillRef>
+          <a:effectRef idx="0">
+            <a:schemeClr val="accent1"/>
+          </a:effectRef>
+          <a:fontRef idx="minor">
+            <a:schemeClr val="tx1"/>
+          </a:fontRef>
+        </p:style>
+      </p:cxnSp>
+      <p:sp>
+        <p:nvSpPr>
+          <p:cNvPr id="25" name="ZoneTexte 24"/>
+          <p:cNvSpPr txBox="1"/>
+          <p:nvPr/>
+        </p:nvSpPr>
+        <p:spPr>
+          <a:xfrm>
+            <a:off x="8157851" y="2670049"/>
+            <a:ext cx="957313" cy="369332"/>
+          </a:xfrm>
+          <a:prstGeom prst="rect">
+            <a:avLst/>
+          </a:prstGeom>
+          <a:noFill/>
+        </p:spPr>
+        <p:txBody>
+          <a:bodyPr wrap="none" rtlCol="0">
+            <a:spAutoFit/>
+          </a:bodyPr>
+          <a:lstStyle/>
+          <a:p>
+            <a:r>
+              <a:rPr lang="en-GB" dirty="0" smtClean="0"/>
+              <a:t>200 mm</a:t>
+            </a:r>
+            <a:endParaRPr lang="en-GB" dirty="0"/>
+          </a:p>
+        </p:txBody>
+      </p:sp>
+      <p:sp>
+        <p:nvSpPr>
+          <p:cNvPr id="26" name="ZoneTexte 25"/>
+          <p:cNvSpPr txBox="1"/>
+          <p:nvPr/>
+        </p:nvSpPr>
+        <p:spPr>
+          <a:xfrm>
+            <a:off x="2292448" y="2768846"/>
+            <a:ext cx="965072" cy="369332"/>
+          </a:xfrm>
+          <a:prstGeom prst="rect">
+            <a:avLst/>
+          </a:prstGeom>
+          <a:noFill/>
+        </p:spPr>
+        <p:txBody>
+          <a:bodyPr wrap="none" rtlCol="0">
+            <a:spAutoFit/>
+          </a:bodyPr>
+          <a:lstStyle/>
+          <a:p>
+            <a:r>
+              <a:rPr lang="en-GB" b="1" i="1" u="sng" dirty="0" smtClean="0"/>
+              <a:t>Sketch 1</a:t>
+            </a:r>
+            <a:endParaRPr lang="en-GB" b="1" i="1" u="sng" dirty="0"/>
+          </a:p>
+        </p:txBody>
+      </p:sp>
+      <p:sp>
+        <p:nvSpPr>
+          <p:cNvPr id="27" name="ZoneTexte 26"/>
+          <p:cNvSpPr txBox="1"/>
+          <p:nvPr/>
+        </p:nvSpPr>
+        <p:spPr>
+          <a:xfrm>
+            <a:off x="9007573" y="6176129"/>
+            <a:ext cx="965072" cy="369332"/>
+          </a:xfrm>
+          <a:prstGeom prst="rect">
+            <a:avLst/>
+          </a:prstGeom>
+          <a:noFill/>
+        </p:spPr>
+        <p:txBody>
+          <a:bodyPr wrap="none" rtlCol="0">
+            <a:spAutoFit/>
+          </a:bodyPr>
+          <a:lstStyle/>
+          <a:p>
+            <a:r>
+              <a:rPr lang="en-GB" b="1" i="1" u="sng" dirty="0" smtClean="0"/>
+              <a:t>Sketch 4</a:t>
+            </a:r>
+            <a:endParaRPr lang="en-GB" b="1" i="1" u="sng" dirty="0"/>
+          </a:p>
+        </p:txBody>
+      </p:sp>
+      <p:sp>
+        <p:nvSpPr>
+          <p:cNvPr id="28" name="ZoneTexte 27"/>
+          <p:cNvSpPr txBox="1"/>
+          <p:nvPr/>
+        </p:nvSpPr>
+        <p:spPr>
+          <a:xfrm>
+            <a:off x="2073373" y="6360795"/>
+            <a:ext cx="965072" cy="369332"/>
+          </a:xfrm>
+          <a:prstGeom prst="rect">
+            <a:avLst/>
+          </a:prstGeom>
+          <a:noFill/>
+        </p:spPr>
+        <p:txBody>
+          <a:bodyPr wrap="none" rtlCol="0">
+            <a:spAutoFit/>
+          </a:bodyPr>
+          <a:lstStyle/>
+          <a:p>
+            <a:r>
+              <a:rPr lang="en-GB" b="1" i="1" u="sng" dirty="0" smtClean="0"/>
+              <a:t>Sketch 3</a:t>
+            </a:r>
+            <a:endParaRPr lang="en-GB" b="1" i="1" u="sng" dirty="0"/>
+          </a:p>
+        </p:txBody>
+      </p:sp>
+      <p:sp>
+        <p:nvSpPr>
+          <p:cNvPr id="29" name="ZoneTexte 28"/>
+          <p:cNvSpPr txBox="1"/>
+          <p:nvPr/>
+        </p:nvSpPr>
+        <p:spPr>
+          <a:xfrm>
+            <a:off x="8434959" y="2985277"/>
+            <a:ext cx="965072" cy="369332"/>
+          </a:xfrm>
+          <a:prstGeom prst="rect">
+            <a:avLst/>
+          </a:prstGeom>
+          <a:noFill/>
+        </p:spPr>
+        <p:txBody>
+          <a:bodyPr wrap="none" rtlCol="0">
+            <a:spAutoFit/>
+          </a:bodyPr>
+          <a:lstStyle/>
+          <a:p>
+            <a:r>
+              <a:rPr lang="en-GB" b="1" i="1" u="sng" dirty="0" smtClean="0"/>
+              <a:t>Sketch 2</a:t>
+            </a:r>
+            <a:endParaRPr lang="en-GB" b="1" i="1" u="sng" dirty="0"/>
+          </a:p>
+        </p:txBody>
+      </p:sp>
+      <p:sp>
+        <p:nvSpPr>
+          <p:cNvPr id="30" name="ZoneTexte 29"/>
+          <p:cNvSpPr txBox="1"/>
+          <p:nvPr/>
+        </p:nvSpPr>
+        <p:spPr>
+          <a:xfrm>
+            <a:off x="7230828" y="426107"/>
+            <a:ext cx="524503" cy="369332"/>
+          </a:xfrm>
+          <a:prstGeom prst="rect">
+            <a:avLst/>
+          </a:prstGeom>
+          <a:noFill/>
+        </p:spPr>
+        <p:txBody>
+          <a:bodyPr wrap="none" rtlCol="0">
+            <a:spAutoFit/>
+          </a:bodyPr>
+          <a:lstStyle/>
+          <a:p>
+            <a:r>
+              <a:rPr lang="en-GB" dirty="0" smtClean="0"/>
+              <a:t>DM</a:t>
+            </a:r>
+            <a:endParaRPr lang="en-GB" dirty="0"/>
+          </a:p>
+        </p:txBody>
+      </p:sp>
+      <p:sp>
+        <p:nvSpPr>
+          <p:cNvPr id="31" name="ZoneTexte 30"/>
+          <p:cNvSpPr txBox="1"/>
+          <p:nvPr/>
+        </p:nvSpPr>
+        <p:spPr>
+          <a:xfrm>
+            <a:off x="1311584" y="4085261"/>
+            <a:ext cx="524503" cy="369332"/>
+          </a:xfrm>
+          <a:prstGeom prst="rect">
+            <a:avLst/>
+          </a:prstGeom>
+          <a:noFill/>
+        </p:spPr>
+        <p:txBody>
+          <a:bodyPr wrap="none" rtlCol="0">
+            <a:spAutoFit/>
+          </a:bodyPr>
+          <a:lstStyle/>
+          <a:p>
+            <a:r>
+              <a:rPr lang="en-GB" dirty="0" smtClean="0"/>
+              <a:t>DM</a:t>
+            </a:r>
+            <a:endParaRPr lang="en-GB" dirty="0"/>
+          </a:p>
+        </p:txBody>
+      </p:sp>
+      <p:sp>
+        <p:nvSpPr>
+          <p:cNvPr id="32" name="ZoneTexte 31"/>
+          <p:cNvSpPr txBox="1"/>
+          <p:nvPr/>
+        </p:nvSpPr>
+        <p:spPr>
+          <a:xfrm>
+            <a:off x="7417569" y="4040871"/>
+            <a:ext cx="524503" cy="369332"/>
+          </a:xfrm>
+          <a:prstGeom prst="rect">
+            <a:avLst/>
+          </a:prstGeom>
+          <a:noFill/>
+        </p:spPr>
+        <p:txBody>
+          <a:bodyPr wrap="none" rtlCol="0">
+            <a:spAutoFit/>
+          </a:bodyPr>
+          <a:lstStyle/>
+          <a:p>
+            <a:r>
+              <a:rPr lang="en-GB" dirty="0" smtClean="0"/>
+              <a:t>DM</a:t>
+            </a:r>
+            <a:endParaRPr lang="en-GB" dirty="0"/>
+          </a:p>
+        </p:txBody>
+      </p:sp>
+      <p:sp>
+        <p:nvSpPr>
+          <p:cNvPr id="33" name="Rectangle 32"/>
+          <p:cNvSpPr/>
+          <p:nvPr/>
+        </p:nvSpPr>
+        <p:spPr>
+          <a:xfrm>
+            <a:off x="1193263" y="4808661"/>
+            <a:ext cx="1527048" cy="1492707"/>
+          </a:xfrm>
+          <a:prstGeom prst="rect">
+            <a:avLst/>
+          </a:prstGeom>
+          <a:solidFill>
+            <a:srgbClr val="5B9BD5">
+              <a:alpha val="21176"/>
+            </a:srgbClr>
+          </a:solidFill>
+          <a:ln>
+            <a:solidFill>
+              <a:schemeClr val="tx1"/>
+            </a:solidFill>
+          </a:ln>
+        </p:spPr>
+        <p:style>
+          <a:lnRef idx="2">
+            <a:schemeClr val="accent1">
+              <a:shade val="50000"/>
+            </a:schemeClr>
+          </a:lnRef>
+          <a:fillRef idx="1">
+            <a:schemeClr val="accent1"/>
+          </a:fillRef>
+          <a:effectRef idx="0">
+            <a:schemeClr val="accent1"/>
+          </a:effectRef>
+          <a:fontRef idx="minor">
+            <a:schemeClr val="lt1"/>
+          </a:fontRef>
+        </p:style>
+        <p:txBody>
+          <a:bodyPr rtlCol="0" anchor="ctr"/>
+          <a:lstStyle/>
+          <a:p>
+            <a:pPr algn="ctr"/>
+            <a:endParaRPr lang="en-GB" dirty="0"/>
+          </a:p>
+        </p:txBody>
+      </p:sp>
+      <p:sp>
+        <p:nvSpPr>
+          <p:cNvPr id="34" name="ZoneTexte 33"/>
+          <p:cNvSpPr txBox="1"/>
+          <p:nvPr/>
+        </p:nvSpPr>
+        <p:spPr>
+          <a:xfrm>
+            <a:off x="1193263" y="4784585"/>
+            <a:ext cx="509627" cy="369332"/>
+          </a:xfrm>
+          <a:prstGeom prst="rect">
+            <a:avLst/>
+          </a:prstGeom>
+          <a:noFill/>
+        </p:spPr>
+        <p:txBody>
+          <a:bodyPr wrap="none" rtlCol="0">
+            <a:spAutoFit/>
+          </a:bodyPr>
+          <a:lstStyle/>
+          <a:p>
+            <a:r>
+              <a:rPr lang="en-GB" dirty="0"/>
+              <a:t>FCL</a:t>
+            </a:r>
+            <a:endParaRPr lang="en-GB" dirty="0"/>
+          </a:p>
+        </p:txBody>
+      </p:sp>
+      <p:sp>
+        <p:nvSpPr>
+          <p:cNvPr id="35" name="Rectangle 34"/>
+          <p:cNvSpPr/>
+          <p:nvPr/>
+        </p:nvSpPr>
+        <p:spPr>
+          <a:xfrm>
+            <a:off x="6563778" y="4784147"/>
+            <a:ext cx="1527048" cy="1492707"/>
+          </a:xfrm>
+          <a:prstGeom prst="rect">
+            <a:avLst/>
+          </a:prstGeom>
+          <a:solidFill>
+            <a:srgbClr val="5B9BD5">
+              <a:alpha val="21176"/>
+            </a:srgbClr>
+          </a:solidFill>
+          <a:ln>
+            <a:solidFill>
+              <a:schemeClr val="tx1"/>
+            </a:solidFill>
+          </a:ln>
+        </p:spPr>
+        <p:style>
+          <a:lnRef idx="2">
+            <a:schemeClr val="accent1">
+              <a:shade val="50000"/>
+            </a:schemeClr>
+          </a:lnRef>
+          <a:fillRef idx="1">
+            <a:schemeClr val="accent1"/>
+          </a:fillRef>
+          <a:effectRef idx="0">
+            <a:schemeClr val="accent1"/>
+          </a:effectRef>
+          <a:fontRef idx="minor">
+            <a:schemeClr val="lt1"/>
+          </a:fontRef>
+        </p:style>
+        <p:txBody>
+          <a:bodyPr rtlCol="0" anchor="ctr"/>
+          <a:lstStyle/>
+          <a:p>
+            <a:pPr algn="ctr"/>
+            <a:endParaRPr lang="en-GB" dirty="0"/>
+          </a:p>
+        </p:txBody>
+      </p:sp>
+      <p:sp>
+        <p:nvSpPr>
+          <p:cNvPr id="36" name="ZoneTexte 35"/>
+          <p:cNvSpPr txBox="1"/>
+          <p:nvPr/>
+        </p:nvSpPr>
+        <p:spPr>
+          <a:xfrm>
+            <a:off x="6563778" y="4760071"/>
+            <a:ext cx="509627" cy="369332"/>
+          </a:xfrm>
+          <a:prstGeom prst="rect">
+            <a:avLst/>
+          </a:prstGeom>
+          <a:noFill/>
+        </p:spPr>
+        <p:txBody>
+          <a:bodyPr wrap="none" rtlCol="0">
+            <a:spAutoFit/>
+          </a:bodyPr>
+          <a:lstStyle/>
+          <a:p>
+            <a:r>
+              <a:rPr lang="en-GB" dirty="0"/>
+              <a:t>FCL</a:t>
+            </a:r>
+            <a:endParaRPr lang="en-GB" dirty="0"/>
+          </a:p>
+        </p:txBody>
+      </p:sp>
+      <p:sp>
+        <p:nvSpPr>
+          <p:cNvPr id="37" name="ZoneTexte 36"/>
+          <p:cNvSpPr txBox="1"/>
+          <p:nvPr/>
+        </p:nvSpPr>
+        <p:spPr>
+          <a:xfrm>
+            <a:off x="609672" y="5998129"/>
+            <a:ext cx="2180020" cy="369332"/>
+          </a:xfrm>
+          <a:prstGeom prst="rect">
+            <a:avLst/>
+          </a:prstGeom>
+          <a:noFill/>
+        </p:spPr>
+        <p:txBody>
+          <a:bodyPr wrap="none" rtlCol="0">
+            <a:spAutoFit/>
+          </a:bodyPr>
+          <a:lstStyle/>
+          <a:p>
+            <a:r>
+              <a:rPr lang="en-GB" dirty="0" smtClean="0"/>
+              <a:t>Telescope focal plane</a:t>
+            </a:r>
+            <a:endParaRPr lang="en-GB" dirty="0"/>
+          </a:p>
+        </p:txBody>
+      </p:sp>
+      <p:cxnSp>
+        <p:nvCxnSpPr>
+          <p:cNvPr id="38" name="Connecteur en angle 37"/>
+          <p:cNvCxnSpPr/>
+          <p:nvPr/>
+        </p:nvCxnSpPr>
+        <p:spPr>
+          <a:xfrm rot="5400000" flipH="1" flipV="1">
+            <a:off x="1572601" y="5689463"/>
+            <a:ext cx="393192" cy="341253"/>
+          </a:xfrm>
+          <a:prstGeom prst="bentConnector3">
+            <a:avLst/>
+          </a:prstGeom>
+          <a:ln>
+            <a:solidFill>
+              <a:schemeClr val="tx1"/>
+            </a:solidFill>
+            <a:tailEnd type="triangle"/>
+          </a:ln>
+        </p:spPr>
+        <p:style>
+          <a:lnRef idx="1">
+            <a:schemeClr val="accent1"/>
+          </a:lnRef>
+          <a:fillRef idx="0">
+            <a:schemeClr val="accent1"/>
+          </a:fillRef>
+          <a:effectRef idx="0">
+            <a:schemeClr val="accent1"/>
+          </a:effectRef>
+          <a:fontRef idx="minor">
+            <a:schemeClr val="tx1"/>
+          </a:fontRef>
+        </p:style>
+      </p:cxnSp>
+      <p:sp>
+        <p:nvSpPr>
+          <p:cNvPr id="39" name="ZoneTexte 38"/>
+          <p:cNvSpPr txBox="1"/>
+          <p:nvPr/>
+        </p:nvSpPr>
+        <p:spPr>
+          <a:xfrm>
+            <a:off x="6563778" y="2393682"/>
+            <a:ext cx="2180020" cy="369332"/>
+          </a:xfrm>
+          <a:prstGeom prst="rect">
+            <a:avLst/>
+          </a:prstGeom>
+          <a:noFill/>
+        </p:spPr>
+        <p:txBody>
+          <a:bodyPr wrap="none" rtlCol="0">
+            <a:spAutoFit/>
+          </a:bodyPr>
+          <a:lstStyle/>
+          <a:p>
+            <a:r>
+              <a:rPr lang="en-GB" dirty="0" smtClean="0"/>
+              <a:t>Telescope focal plane</a:t>
+            </a:r>
+            <a:endParaRPr lang="en-GB" dirty="0"/>
+          </a:p>
+        </p:txBody>
+      </p:sp>
+      <p:cxnSp>
+        <p:nvCxnSpPr>
+          <p:cNvPr id="40" name="Connecteur en angle 39"/>
+          <p:cNvCxnSpPr/>
+          <p:nvPr/>
+        </p:nvCxnSpPr>
+        <p:spPr>
+          <a:xfrm rot="5400000" flipH="1" flipV="1">
+            <a:off x="7526707" y="2085016"/>
+            <a:ext cx="393192" cy="341253"/>
+          </a:xfrm>
+          <a:prstGeom prst="bentConnector3">
+            <a:avLst/>
+          </a:prstGeom>
+          <a:ln>
+            <a:solidFill>
+              <a:schemeClr val="tx1"/>
+            </a:solidFill>
+            <a:tailEnd type="triangle"/>
+          </a:ln>
+        </p:spPr>
+        <p:style>
+          <a:lnRef idx="1">
+            <a:schemeClr val="accent1"/>
+          </a:lnRef>
+          <a:fillRef idx="0">
+            <a:schemeClr val="accent1"/>
+          </a:fillRef>
+          <a:effectRef idx="0">
+            <a:schemeClr val="accent1"/>
+          </a:effectRef>
+          <a:fontRef idx="minor">
+            <a:schemeClr val="tx1"/>
+          </a:fontRef>
+        </p:style>
+      </p:cxnSp>
+      <p:sp>
+        <p:nvSpPr>
+          <p:cNvPr id="41" name="ZoneTexte 40"/>
+          <p:cNvSpPr txBox="1"/>
+          <p:nvPr/>
+        </p:nvSpPr>
+        <p:spPr>
+          <a:xfrm>
+            <a:off x="6733142" y="5949101"/>
+            <a:ext cx="2180020" cy="369332"/>
+          </a:xfrm>
+          <a:prstGeom prst="rect">
+            <a:avLst/>
+          </a:prstGeom>
+          <a:noFill/>
+        </p:spPr>
+        <p:txBody>
+          <a:bodyPr wrap="none" rtlCol="0">
+            <a:spAutoFit/>
+          </a:bodyPr>
+          <a:lstStyle/>
+          <a:p>
+            <a:r>
+              <a:rPr lang="en-GB" dirty="0" smtClean="0"/>
+              <a:t>Telescope focal plane</a:t>
+            </a:r>
+            <a:endParaRPr lang="en-GB" dirty="0"/>
+          </a:p>
+        </p:txBody>
+      </p:sp>
+      <p:cxnSp>
+        <p:nvCxnSpPr>
+          <p:cNvPr id="42" name="Connecteur en angle 41"/>
+          <p:cNvCxnSpPr/>
+          <p:nvPr/>
+        </p:nvCxnSpPr>
+        <p:spPr>
+          <a:xfrm rot="5400000" flipH="1" flipV="1">
+            <a:off x="7696071" y="5640435"/>
+            <a:ext cx="393192" cy="341253"/>
+          </a:xfrm>
+          <a:prstGeom prst="bentConnector3">
+            <a:avLst/>
+          </a:prstGeom>
+          <a:ln>
+            <a:solidFill>
+              <a:schemeClr val="tx1"/>
+            </a:solidFill>
+            <a:tailEnd type="triangle"/>
+          </a:ln>
+        </p:spPr>
+        <p:style>
+          <a:lnRef idx="1">
+            <a:schemeClr val="accent1"/>
+          </a:lnRef>
+          <a:fillRef idx="0">
+            <a:schemeClr val="accent1"/>
+          </a:fillRef>
+          <a:effectRef idx="0">
+            <a:schemeClr val="accent1"/>
+          </a:effectRef>
+          <a:fontRef idx="minor">
+            <a:schemeClr val="tx1"/>
+          </a:fontRef>
+        </p:style>
+      </p:cxnSp>
+    </p:spTree>
+    <p:extLst>
+      <p:ext uri="{BB962C8B-B14F-4D97-AF65-F5344CB8AC3E}">
+        <p14:creationId xmlns:p14="http://schemas.microsoft.com/office/powerpoint/2010/main" val="2433654700"/>
+      </p:ext>
+    </p:extLst>
+  </p:cSld>
+  <p:clrMapOvr>
+    <a:masterClrMapping/>
+  </p:clrMapOvr>
+</p:sld>
+</file>
+
+<file path=ppt/slides/slide3.xml><?xml version="1.0" encoding="utf-8"?>
+<p:sld xmlns:a="http://schemas.openxmlformats.org/drawingml/2006/main" xmlns:r="http://schemas.openxmlformats.org/officeDocument/2006/relationships" xmlns:p="http://schemas.openxmlformats.org/presentationml/2006/main">
+  <p:cSld>
+    <p:spTree>
+      <p:nvGrpSpPr>
+        <p:cNvPr id="1" name=""/>
+        <p:cNvGrpSpPr/>
+        <p:nvPr/>
+      </p:nvGrpSpPr>
+      <p:grpSpPr>
+        <a:xfrm>
+          <a:off x="0" y="0"/>
+          <a:ext cx="0" cy="0"/>
+          <a:chOff x="0" y="0"/>
+          <a:chExt cx="0" cy="0"/>
+        </a:xfrm>
+      </p:grpSpPr>
+      <p:pic>
+        <p:nvPicPr>
+          <p:cNvPr id="4" name="Image 3"/>
+          <p:cNvPicPr>
+            <a:picLocks noChangeAspect="1"/>
+          </p:cNvPicPr>
+          <p:nvPr/>
+        </p:nvPicPr>
+        <p:blipFill>
+          <a:blip r:embed="rId2"/>
+          <a:stretch>
+            <a:fillRect/>
+          </a:stretch>
+        </p:blipFill>
+        <p:spPr>
+          <a:xfrm>
+            <a:off x="3062334" y="621437"/>
+            <a:ext cx="5766285" cy="3648722"/>
+          </a:xfrm>
+          <a:prstGeom prst="rect">
+            <a:avLst/>
+          </a:prstGeom>
+        </p:spPr>
+      </p:pic>
+      <p:sp>
+        <p:nvSpPr>
+          <p:cNvPr id="13" name="Rectangle 12"/>
+          <p:cNvSpPr/>
+          <p:nvPr/>
+        </p:nvSpPr>
+        <p:spPr>
+          <a:xfrm>
+            <a:off x="3682936" y="2000206"/>
+            <a:ext cx="1743259" cy="1710660"/>
+          </a:xfrm>
+          <a:prstGeom prst="rect">
+            <a:avLst/>
+          </a:prstGeom>
+          <a:solidFill>
+            <a:srgbClr val="5B9BD5">
+              <a:alpha val="21176"/>
+            </a:srgbClr>
+          </a:solidFill>
+          <a:ln>
+            <a:solidFill>
+              <a:schemeClr val="tx1"/>
+            </a:solidFill>
+          </a:ln>
+        </p:spPr>
+        <p:style>
+          <a:lnRef idx="2">
+            <a:schemeClr val="accent1">
+              <a:shade val="50000"/>
+            </a:schemeClr>
+          </a:lnRef>
+          <a:fillRef idx="1">
+            <a:schemeClr val="accent1"/>
+          </a:fillRef>
+          <a:effectRef idx="0">
+            <a:schemeClr val="accent1"/>
+          </a:effectRef>
+          <a:fontRef idx="minor">
+            <a:schemeClr val="lt1"/>
+          </a:fontRef>
+        </p:style>
+        <p:txBody>
+          <a:bodyPr rtlCol="0" anchor="ctr"/>
+          <a:lstStyle/>
+          <a:p>
+            <a:pPr algn="ctr"/>
+            <a:endParaRPr lang="en-GB" dirty="0"/>
+          </a:p>
+        </p:txBody>
+      </p:sp>
+      <p:sp>
+        <p:nvSpPr>
+          <p:cNvPr id="5" name="ZoneTexte 4"/>
+          <p:cNvSpPr txBox="1"/>
+          <p:nvPr/>
+        </p:nvSpPr>
+        <p:spPr>
+          <a:xfrm>
+            <a:off x="4669486" y="624782"/>
+            <a:ext cx="1275990" cy="369332"/>
+          </a:xfrm>
+          <a:prstGeom prst="rect">
+            <a:avLst/>
+          </a:prstGeom>
+          <a:noFill/>
+        </p:spPr>
+        <p:txBody>
+          <a:bodyPr wrap="none" rtlCol="0">
+            <a:spAutoFit/>
+          </a:bodyPr>
+          <a:lstStyle/>
+          <a:p>
+            <a:r>
+              <a:rPr lang="en-GB" dirty="0" smtClean="0">
+                <a:solidFill>
+                  <a:srgbClr val="FA36D5"/>
+                </a:solidFill>
+              </a:rPr>
+              <a:t>Pupil image</a:t>
+            </a:r>
+            <a:endParaRPr lang="en-GB" dirty="0">
+              <a:solidFill>
+                <a:srgbClr val="FA36D5"/>
+              </a:solidFill>
+            </a:endParaRPr>
+          </a:p>
+        </p:txBody>
+      </p:sp>
+      <p:cxnSp>
+        <p:nvCxnSpPr>
+          <p:cNvPr id="7" name="Connecteur droit 6"/>
+          <p:cNvCxnSpPr/>
+          <p:nvPr/>
+        </p:nvCxnSpPr>
+        <p:spPr>
+          <a:xfrm>
+            <a:off x="4648911" y="966273"/>
+            <a:ext cx="0" cy="945411"/>
+          </a:xfrm>
+          <a:prstGeom prst="line">
+            <a:avLst/>
+          </a:prstGeom>
+          <a:ln w="12700">
+            <a:solidFill>
+              <a:srgbClr val="FA36D5"/>
+            </a:solidFill>
+          </a:ln>
+        </p:spPr>
+        <p:style>
+          <a:lnRef idx="1">
+            <a:schemeClr val="accent1"/>
+          </a:lnRef>
+          <a:fillRef idx="0">
+            <a:schemeClr val="accent1"/>
+          </a:fillRef>
+          <a:effectRef idx="0">
+            <a:schemeClr val="accent1"/>
+          </a:effectRef>
+          <a:fontRef idx="minor">
+            <a:schemeClr val="tx1"/>
+          </a:fontRef>
+        </p:style>
+      </p:cxnSp>
+      <p:sp>
+        <p:nvSpPr>
+          <p:cNvPr id="8" name="ZoneTexte 7"/>
+          <p:cNvSpPr txBox="1"/>
+          <p:nvPr/>
+        </p:nvSpPr>
+        <p:spPr>
+          <a:xfrm>
+            <a:off x="8305237" y="2120854"/>
+            <a:ext cx="703078" cy="369332"/>
+          </a:xfrm>
+          <a:prstGeom prst="rect">
+            <a:avLst/>
+          </a:prstGeom>
+          <a:noFill/>
+        </p:spPr>
+        <p:txBody>
+          <a:bodyPr wrap="none" rtlCol="0">
+            <a:spAutoFit/>
+          </a:bodyPr>
+          <a:lstStyle/>
+          <a:p>
+            <a:r>
+              <a:rPr lang="en-GB" dirty="0" smtClean="0"/>
+              <a:t>OAP0</a:t>
+            </a:r>
+            <a:endParaRPr lang="en-GB" dirty="0"/>
+          </a:p>
+        </p:txBody>
+      </p:sp>
+      <p:sp>
+        <p:nvSpPr>
+          <p:cNvPr id="9" name="ZoneTexte 8"/>
+          <p:cNvSpPr txBox="1"/>
+          <p:nvPr/>
+        </p:nvSpPr>
+        <p:spPr>
+          <a:xfrm>
+            <a:off x="3276118" y="3799388"/>
+            <a:ext cx="2180020" cy="646331"/>
+          </a:xfrm>
+          <a:prstGeom prst="rect">
+            <a:avLst/>
+          </a:prstGeom>
+          <a:noFill/>
+        </p:spPr>
+        <p:txBody>
+          <a:bodyPr wrap="none" rtlCol="0">
+            <a:spAutoFit/>
+          </a:bodyPr>
+          <a:lstStyle/>
+          <a:p>
+            <a:r>
+              <a:rPr lang="en-GB" dirty="0" smtClean="0"/>
+              <a:t>Telescope focal </a:t>
+            </a:r>
+            <a:r>
+              <a:rPr lang="en-GB" dirty="0" smtClean="0"/>
+              <a:t>plane</a:t>
+            </a:r>
+          </a:p>
+          <a:p>
+            <a:pPr algn="ctr"/>
+            <a:r>
+              <a:rPr lang="en-GB" dirty="0" smtClean="0"/>
+              <a:t>(FoV = 1’)</a:t>
+            </a:r>
+            <a:endParaRPr lang="en-GB" dirty="0"/>
+          </a:p>
+        </p:txBody>
+      </p:sp>
+      <p:cxnSp>
+        <p:nvCxnSpPr>
+          <p:cNvPr id="10" name="Connecteur en angle 9"/>
+          <p:cNvCxnSpPr>
+            <a:stCxn id="9" idx="0"/>
+          </p:cNvCxnSpPr>
+          <p:nvPr/>
+        </p:nvCxnSpPr>
+        <p:spPr>
+          <a:xfrm rot="5400000" flipH="1" flipV="1">
+            <a:off x="4018583" y="3281217"/>
+            <a:ext cx="865716" cy="170626"/>
+          </a:xfrm>
+          <a:prstGeom prst="bentConnector3">
+            <a:avLst/>
+          </a:prstGeom>
+          <a:ln>
+            <a:solidFill>
+              <a:schemeClr val="tx1"/>
+            </a:solidFill>
+            <a:tailEnd type="triangle"/>
+          </a:ln>
+        </p:spPr>
+        <p:style>
+          <a:lnRef idx="1">
+            <a:schemeClr val="accent1"/>
+          </a:lnRef>
+          <a:fillRef idx="0">
+            <a:schemeClr val="accent1"/>
+          </a:fillRef>
+          <a:effectRef idx="0">
+            <a:schemeClr val="accent1"/>
+          </a:effectRef>
+          <a:fontRef idx="minor">
+            <a:schemeClr val="tx1"/>
+          </a:fontRef>
+        </p:style>
+      </p:cxnSp>
+      <p:sp>
+        <p:nvSpPr>
+          <p:cNvPr id="11" name="Arc 10"/>
+          <p:cNvSpPr/>
+          <p:nvPr/>
+        </p:nvSpPr>
+        <p:spPr>
+          <a:xfrm rot="4004274">
+            <a:off x="5994435" y="2856733"/>
+            <a:ext cx="630911" cy="663847"/>
+          </a:xfrm>
+          <a:prstGeom prst="arc">
+            <a:avLst/>
+          </a:prstGeom>
+          <a:ln>
+            <a:solidFill>
+              <a:schemeClr val="tx1"/>
+            </a:solidFill>
+          </a:ln>
+        </p:spPr>
+        <p:style>
+          <a:lnRef idx="1">
+            <a:schemeClr val="accent1"/>
+          </a:lnRef>
+          <a:fillRef idx="0">
+            <a:schemeClr val="accent1"/>
+          </a:fillRef>
+          <a:effectRef idx="0">
+            <a:schemeClr val="accent1"/>
+          </a:effectRef>
+          <a:fontRef idx="minor">
+            <a:schemeClr val="tx1"/>
+          </a:fontRef>
+        </p:style>
+        <p:txBody>
+          <a:bodyPr rtlCol="0" anchor="ctr"/>
+          <a:lstStyle/>
+          <a:p>
+            <a:pPr algn="ctr"/>
+            <a:endParaRPr lang="en-GB"/>
+          </a:p>
+        </p:txBody>
+      </p:sp>
+      <p:sp>
+        <p:nvSpPr>
+          <p:cNvPr id="12" name="ZoneTexte 11"/>
+          <p:cNvSpPr txBox="1"/>
+          <p:nvPr/>
+        </p:nvSpPr>
+        <p:spPr>
+          <a:xfrm>
+            <a:off x="6635335" y="3104003"/>
+            <a:ext cx="788999" cy="369332"/>
+          </a:xfrm>
+          <a:prstGeom prst="rect">
+            <a:avLst/>
+          </a:prstGeom>
+          <a:noFill/>
+        </p:spPr>
+        <p:txBody>
+          <a:bodyPr wrap="none" rtlCol="0">
+            <a:spAutoFit/>
+          </a:bodyPr>
+          <a:lstStyle/>
+          <a:p>
+            <a:r>
+              <a:rPr lang="el-GR" dirty="0" smtClean="0"/>
+              <a:t>θ</a:t>
+            </a:r>
+            <a:r>
+              <a:rPr lang="fr-CH" dirty="0" smtClean="0"/>
+              <a:t>= 20°</a:t>
+            </a:r>
+            <a:endParaRPr lang="en-GB" dirty="0"/>
+          </a:p>
+        </p:txBody>
+      </p:sp>
+      <p:sp>
+        <p:nvSpPr>
+          <p:cNvPr id="14" name="ZoneTexte 13"/>
+          <p:cNvSpPr txBox="1"/>
+          <p:nvPr/>
+        </p:nvSpPr>
+        <p:spPr>
+          <a:xfrm>
+            <a:off x="3682937" y="2017962"/>
+            <a:ext cx="569896" cy="369332"/>
+          </a:xfrm>
+          <a:prstGeom prst="rect">
+            <a:avLst/>
+          </a:prstGeom>
+          <a:noFill/>
+        </p:spPr>
+        <p:txBody>
+          <a:bodyPr wrap="square" rtlCol="0">
+            <a:spAutoFit/>
+          </a:bodyPr>
+          <a:lstStyle/>
+          <a:p>
+            <a:r>
+              <a:rPr lang="en-GB" dirty="0"/>
+              <a:t>FCL</a:t>
+            </a:r>
+            <a:endParaRPr lang="en-GB" dirty="0"/>
+          </a:p>
+        </p:txBody>
+      </p:sp>
+      <p:cxnSp>
+        <p:nvCxnSpPr>
+          <p:cNvPr id="17" name="Connecteur droit 16"/>
+          <p:cNvCxnSpPr/>
+          <p:nvPr/>
+        </p:nvCxnSpPr>
+        <p:spPr>
+          <a:xfrm>
+            <a:off x="4554565" y="2855536"/>
+            <a:ext cx="3632306" cy="1317737"/>
+          </a:xfrm>
+          <a:prstGeom prst="line">
+            <a:avLst/>
+          </a:prstGeom>
+        </p:spPr>
+        <p:style>
+          <a:lnRef idx="1">
+            <a:schemeClr val="accent1"/>
+          </a:lnRef>
+          <a:fillRef idx="0">
+            <a:schemeClr val="accent1"/>
+          </a:fillRef>
+          <a:effectRef idx="0">
+            <a:schemeClr val="accent1"/>
+          </a:effectRef>
+          <a:fontRef idx="minor">
+            <a:schemeClr val="tx1"/>
+          </a:fontRef>
+        </p:style>
+      </p:cxnSp>
+    </p:spTree>
+    <p:extLst>
+      <p:ext uri="{BB962C8B-B14F-4D97-AF65-F5344CB8AC3E}">
+        <p14:creationId xmlns:p14="http://schemas.microsoft.com/office/powerpoint/2010/main" val="1493971457"/>
       </p:ext>
     </p:extLst>
   </p:cSld>

</xml_diff>